<commit_message>
Add clickable source hyperlinks and fix workshop script syntax
- Update bigNum helper in 3 decks to render source citations as
  clickable hyperlinks via PptxGenJS hyperlink option
- Wire all source URLs from narrative docs into generation scripts
  (DataReportal, Reuters, McKinsey, ServiceNow, Second Talent,
  Addy Osmani, Microsoft/Neowin)
- Add source URLs to all speaker notes that reference sources
- Find and add direct Reuters URL for <2% premium stat
- Fix literal newlines in JS string literals across all 4 workshop
  scripts (was preventing generation)
- Regenerate all 6 .pptx files

Co-Authored-By: Claude Opus 4.6 <noreply@anthropic.com>
</commit_message>
<xml_diff>
--- a/decks/ai-academy-pitch/ai-academy-pitch.pptx
+++ b/decks/ai-academy-pitch/ai-academy-pitch.pptx
@@ -863,7 +863,10 @@
           <a:p>
             <a:r>
               <a:rPr lang="en-US" dirty="0"/>
-              <a:t>Mass adoption but shallow depth. The opportunity gap is enormous. ~15 seconds.</a:t>
+              <a:t>Sources: DataReportal 2026, Reuters.
+• https://datareportal.com/reports/digital-2026-one-billion-people-using-ai
+• https://www.reuters.com/commentary/breakingviews/ai-investment-bubble-inflated-by-trio-dilemmas-2025-09-25/
+Mass adoption but shallow depth. The opportunity gap is enormous. ~15 seconds.</a:t>
             </a:r>
             <a:endParaRPr lang="en-US" dirty="0"/>
           </a:p>
@@ -951,7 +954,8 @@
           <a:p>
             <a:r>
               <a:rPr lang="en-US" dirty="0"/>
-              <a:t>Developers who felt 20% faster actually took 19% longer once debugging was included. The gap isn’t just unused potential — it’s active harm. ~15 seconds.</a:t>
+              <a:t>Source: Addy Osmani — https://addyo.substack.com/p/the-reality-of-ai-assisted-software
+Developers who felt 20% faster actually took 19% longer once debugging was included. The gap isn’t just unused potential — it’s active harm. ~15 seconds.</a:t>
             </a:r>
             <a:endParaRPr lang="en-US" dirty="0"/>
           </a:p>
@@ -2302,15 +2306,57 @@
               <a:buNone/>
             </a:pPr>
             <a:r>
-              <a:rPr lang="en-US" sz="1100" dirty="0">
+              <a:rPr lang="en-US" sz="1100" u="sng" dirty="0">
                 <a:solidFill>
                   <a:srgbClr val="94A3B8"/>
                 </a:solidFill>
                 <a:latin typeface="Calibri" pitchFamily="34" charset="0"/>
                 <a:ea typeface="Calibri" pitchFamily="34" charset="-122"/>
                 <a:cs typeface="Calibri" pitchFamily="34" charset="-120"/>
-              </a:rPr>
-              <a:t>DataReportal 2026, Reuters</a:t>
+                <a:hlinkClick r:id="rId1" invalidUrl="" action="" tgtFrame="" tooltip="" history="1" highlightClick="0" endSnd="0">
+                  <a:extLst>
+                    <a:ext uri="{A12FA001-AC4F-418D-AE19-62706E023703}">
+                      <ahyp:hlinkClr xmlns:ahyp="http://schemas.microsoft.com/office/drawing/2018/hyperlinkcolor" val="tx"/>
+                    </a:ext>
+                  </a:extLst>
+                </a:hlinkClick>
+              </a:rPr>
+              <a:t>DataReportal 2026</a:t>
+            </a:r>
+            <a:pPr algn="r" indent="0" marL="0">
+              <a:buNone/>
+            </a:pPr>
+            <a:r>
+              <a:rPr lang="en-US" sz="1100" dirty="0">
+                <a:solidFill>
+                  <a:srgbClr val="94A3B8"/>
+                </a:solidFill>
+                <a:latin typeface="Calibri" pitchFamily="34" charset="0"/>
+                <a:ea typeface="Calibri" pitchFamily="34" charset="-122"/>
+                <a:cs typeface="Calibri" pitchFamily="34" charset="-120"/>
+              </a:rPr>
+              <a:t>, </a:t>
+            </a:r>
+            <a:pPr algn="r" indent="0" marL="0">
+              <a:buNone/>
+            </a:pPr>
+            <a:r>
+              <a:rPr lang="en-US" sz="1100" u="sng" dirty="0">
+                <a:solidFill>
+                  <a:srgbClr val="94A3B8"/>
+                </a:solidFill>
+                <a:latin typeface="Calibri" pitchFamily="34" charset="0"/>
+                <a:ea typeface="Calibri" pitchFamily="34" charset="-122"/>
+                <a:cs typeface="Calibri" pitchFamily="34" charset="-120"/>
+                <a:hlinkClick r:id="rId2" invalidUrl="" action="" tgtFrame="" tooltip="" history="1" highlightClick="0" endSnd="0">
+                  <a:extLst>
+                    <a:ext uri="{A12FA001-AC4F-418D-AE19-62706E023703}">
+                      <ahyp:hlinkClr xmlns:ahyp="http://schemas.microsoft.com/office/drawing/2018/hyperlinkcolor" val="tx"/>
+                    </a:ext>
+                  </a:extLst>
+                </a:hlinkClick>
+              </a:rPr>
+              <a:t>Reuters</a:t>
             </a:r>
             <a:endParaRPr lang="en-US" sz="1100" dirty="0"/>
           </a:p>
@@ -2490,13 +2536,20 @@
               <a:buNone/>
             </a:pPr>
             <a:r>
-              <a:rPr lang="en-US" sz="1100" dirty="0">
+              <a:rPr lang="en-US" sz="1100" u="sng" dirty="0">
                 <a:solidFill>
                   <a:srgbClr val="94A3B8"/>
                 </a:solidFill>
                 <a:latin typeface="Calibri" pitchFamily="34" charset="0"/>
                 <a:ea typeface="Calibri" pitchFamily="34" charset="-122"/>
                 <a:cs typeface="Calibri" pitchFamily="34" charset="-120"/>
+                <a:hlinkClick r:id="rId1" invalidUrl="" action="" tgtFrame="" tooltip="" history="1" highlightClick="0" endSnd="0">
+                  <a:extLst>
+                    <a:ext uri="{A12FA001-AC4F-418D-AE19-62706E023703}">
+                      <ahyp:hlinkClr xmlns:ahyp="http://schemas.microsoft.com/office/drawing/2018/hyperlinkcolor" val="tx"/>
+                    </a:ext>
+                  </a:extLst>
+                </a:hlinkClick>
               </a:rPr>
               <a:t>Addy Osmani</a:t>
             </a:r>

</xml_diff>

<commit_message>
Rewrite speaker notes to concise reference style per craft skill convention
Converts conversational script-style notes to terse key phrases across
5 live-presentation decks (34 slides total). Main deck unchanged — exempt
as self-learning documentation per craft skill exception.

Co-Authored-By: Claude Opus 4.6 <noreply@anthropic.com>
</commit_message>
<xml_diff>
--- a/decks/ai-academy-pitch/ai-academy-pitch.pptx
+++ b/decks/ai-academy-pitch/ai-academy-pitch.pptx
@@ -599,7 +599,7 @@
           <a:p>
             <a:r>
               <a:rPr lang="en-US" dirty="0"/>
-              <a:t>Specific, low-commitment ask. 'Not a task you want to learn — a task you already do. You’ll transform it live.' ~15 seconds.</a:t>
+              <a:t>Specific, low-commitment ask. Emphasis: existing weekly task, not new skill. Live transformation in session. ~15 seconds.</a:t>
             </a:r>
             <a:endParaRPr lang="en-US" dirty="0"/>
           </a:p>
@@ -955,7 +955,7 @@
             <a:r>
               <a:rPr lang="en-US" dirty="0"/>
               <a:t>Source: Addy Osmani — https://addyo.substack.com/p/the-reality-of-ai-assisted-software
-Developers who felt 20% faster actually took 19% longer once debugging was included. The gap isn’t just unused potential — it’s active harm. ~15 seconds.</a:t>
+Key contrast: perceived 20% faster vs actual 19% slower after debugging. Gap = active harm, not just missed potential. ~15 seconds.</a:t>
             </a:r>
             <a:endParaRPr lang="en-US" dirty="0"/>
           </a:p>
@@ -1043,7 +1043,7 @@
           <a:p>
             <a:r>
               <a:rPr lang="en-US" dirty="0"/>
-              <a:t>Let this land. The audience should be thinking 'that’s us.' ~10 seconds.</a:t>
+              <a:t>Let it land. Goal: self-identification. ~10 seconds.</a:t>
             </a:r>
             <a:endParaRPr lang="en-US" dirty="0"/>
           </a:p>
@@ -1131,7 +1131,7 @@
           <a:p>
             <a:r>
               <a:rPr lang="en-US" dirty="0"/>
-              <a:t>Self-identification moment. Let people find themselves. ~20 seconds.</a:t>
+              <a:t>Self-identification moment. Pause for audience to locate themselves on spectrum. ~20 seconds.</a:t>
             </a:r>
             <a:endParaRPr lang="en-US" dirty="0"/>
           </a:p>
@@ -1307,7 +1307,7 @@
           <a:p>
             <a:r>
               <a:rPr lang="en-US" dirty="0"/>
-              <a:t>Walk through each briefly. Each one-liner should create curiosity. ~30 seconds.</a:t>
+              <a:t>Brief walkthrough of each session. One-liners = curiosity hooks. ~30 seconds.</a:t>
             </a:r>
             <a:endParaRPr lang="en-US" dirty="0"/>
           </a:p>

</xml_diff>